<commit_message>
Added missing ant_r data files and updated docker files
</commit_message>
<xml_diff>
--- a/ECA-RCCP-WorshopApr2016.pptx
+++ b/ECA-RCCP-WorshopApr2016.pptx
@@ -246,7 +246,7 @@
           <a:p>
             <a:fld id="{6E04E453-D430-B44E-9EFF-220B3399F38E}" type="datetimeFigureOut">
               <a:rPr lang="en-US" smtClean="0"/>
-              <a:t>4/23/16</a:t>
+              <a:t>4/25/16</a:t>
             </a:fld>
             <a:endParaRPr lang="en-US"/>
           </a:p>
@@ -952,7 +952,7 @@
           <a:p>
             <a:fld id="{2DBD2FC0-26C0-8B45-BC00-59DC2F9C0320}" type="datetimeFigureOut">
               <a:rPr lang="en-US" smtClean="0"/>
-              <a:t>4/23/16</a:t>
+              <a:t>4/25/16</a:t>
             </a:fld>
             <a:endParaRPr lang="en-US"/>
           </a:p>
@@ -1238,7 +1238,7 @@
           <a:p>
             <a:fld id="{2DBD2FC0-26C0-8B45-BC00-59DC2F9C0320}" type="datetimeFigureOut">
               <a:rPr lang="en-US" smtClean="0"/>
-              <a:t>4/23/16</a:t>
+              <a:t>4/25/16</a:t>
             </a:fld>
             <a:endParaRPr lang="en-US"/>
           </a:p>
@@ -1660,7 +1660,7 @@
           <a:p>
             <a:fld id="{2DBD2FC0-26C0-8B45-BC00-59DC2F9C0320}" type="datetimeFigureOut">
               <a:rPr lang="en-US" smtClean="0"/>
-              <a:t>4/23/16</a:t>
+              <a:t>4/25/16</a:t>
             </a:fld>
             <a:endParaRPr lang="en-US"/>
           </a:p>
@@ -2077,7 +2077,7 @@
           <a:p>
             <a:fld id="{2DBD2FC0-26C0-8B45-BC00-59DC2F9C0320}" type="datetimeFigureOut">
               <a:rPr lang="en-US" smtClean="0"/>
-              <a:t>4/23/16</a:t>
+              <a:t>4/25/16</a:t>
             </a:fld>
             <a:endParaRPr lang="en-US"/>
           </a:p>
@@ -2210,7 +2210,7 @@
           <a:p>
             <a:fld id="{2DBD2FC0-26C0-8B45-BC00-59DC2F9C0320}" type="datetimeFigureOut">
               <a:rPr lang="en-US" smtClean="0"/>
-              <a:t>4/23/16</a:t>
+              <a:t>4/25/16</a:t>
             </a:fld>
             <a:endParaRPr lang="en-US"/>
           </a:p>
@@ -2532,7 +2532,7 @@
           <a:p>
             <a:fld id="{2DBD2FC0-26C0-8B45-BC00-59DC2F9C0320}" type="datetimeFigureOut">
               <a:rPr lang="en-US" smtClean="0"/>
-              <a:t>4/23/16</a:t>
+              <a:t>4/25/16</a:t>
             </a:fld>
             <a:endParaRPr lang="en-US"/>
           </a:p>
@@ -2776,7 +2776,7 @@
           <a:p>
             <a:fld id="{2DBD2FC0-26C0-8B45-BC00-59DC2F9C0320}" type="datetimeFigureOut">
               <a:rPr lang="en-US" smtClean="0"/>
-              <a:t>4/23/16</a:t>
+              <a:t>4/25/16</a:t>
             </a:fld>
             <a:endParaRPr lang="en-US"/>
           </a:p>
@@ -3114,7 +3114,7 @@
           <a:p>
             <a:fld id="{2DBD2FC0-26C0-8B45-BC00-59DC2F9C0320}" type="datetimeFigureOut">
               <a:rPr lang="en-US" smtClean="0"/>
-              <a:t>4/23/16</a:t>
+              <a:t>4/25/16</a:t>
             </a:fld>
             <a:endParaRPr lang="en-US"/>
           </a:p>
@@ -3414,7 +3414,7 @@
           <a:p>
             <a:fld id="{2DBD2FC0-26C0-8B45-BC00-59DC2F9C0320}" type="datetimeFigureOut">
               <a:rPr lang="en-US" smtClean="0"/>
-              <a:t>4/23/16</a:t>
+              <a:t>4/25/16</a:t>
             </a:fld>
             <a:endParaRPr lang="en-US"/>
           </a:p>
@@ -3821,7 +3821,7 @@
           <a:p>
             <a:fld id="{2DBD2FC0-26C0-8B45-BC00-59DC2F9C0320}" type="datetimeFigureOut">
               <a:rPr lang="en-US" smtClean="0"/>
-              <a:t>4/23/16</a:t>
+              <a:t>4/25/16</a:t>
             </a:fld>
             <a:endParaRPr lang="en-US"/>
           </a:p>
@@ -4043,7 +4043,7 @@
           <a:p>
             <a:fld id="{2DBD2FC0-26C0-8B45-BC00-59DC2F9C0320}" type="datetimeFigureOut">
               <a:rPr lang="en-US" smtClean="0"/>
-              <a:t>4/23/16</a:t>
+              <a:t>4/25/16</a:t>
             </a:fld>
             <a:endParaRPr lang="en-US"/>
           </a:p>
@@ -4260,7 +4260,7 @@
           <a:p>
             <a:fld id="{2DBD2FC0-26C0-8B45-BC00-59DC2F9C0320}" type="datetimeFigureOut">
               <a:rPr lang="en-US" smtClean="0"/>
-              <a:t>4/23/16</a:t>
+              <a:t>4/25/16</a:t>
             </a:fld>
             <a:endParaRPr lang="en-US"/>
           </a:p>
@@ -4565,7 +4565,7 @@
           <a:p>
             <a:fld id="{2DBD2FC0-26C0-8B45-BC00-59DC2F9C0320}" type="datetimeFigureOut">
               <a:rPr lang="en-US" smtClean="0"/>
-              <a:t>4/23/16</a:t>
+              <a:t>4/25/16</a:t>
             </a:fld>
             <a:endParaRPr lang="en-US"/>
           </a:p>
@@ -4892,7 +4892,7 @@
           <a:p>
             <a:fld id="{2DBD2FC0-26C0-8B45-BC00-59DC2F9C0320}" type="datetimeFigureOut">
               <a:rPr lang="en-US" smtClean="0"/>
-              <a:t>4/23/16</a:t>
+              <a:t>4/25/16</a:t>
             </a:fld>
             <a:endParaRPr lang="en-US"/>
           </a:p>
@@ -5227,7 +5227,7 @@
           <a:p>
             <a:fld id="{2DBD2FC0-26C0-8B45-BC00-59DC2F9C0320}" type="datetimeFigureOut">
               <a:rPr lang="en-US" smtClean="0"/>
-              <a:t>4/23/16</a:t>
+              <a:t>4/25/16</a:t>
             </a:fld>
             <a:endParaRPr lang="en-US"/>
           </a:p>
@@ -5850,7 +5850,7 @@
           <a:p>
             <a:fld id="{2DBD2FC0-26C0-8B45-BC00-59DC2F9C0320}" type="datetimeFigureOut">
               <a:rPr lang="en-US" smtClean="0"/>
-              <a:t>4/23/16</a:t>
+              <a:t>4/25/16</a:t>
             </a:fld>
             <a:endParaRPr lang="en-US"/>
           </a:p>
@@ -6337,7 +6337,7 @@
           <a:p>
             <a:fld id="{2DBD2FC0-26C0-8B45-BC00-59DC2F9C0320}" type="datetimeFigureOut">
               <a:rPr lang="en-US" smtClean="0"/>
-              <a:t>4/23/16</a:t>
+              <a:t>4/25/16</a:t>
             </a:fld>
             <a:endParaRPr lang="en-US"/>
           </a:p>
@@ -6585,7 +6585,7 @@
           <a:p>
             <a:fld id="{2DBD2FC0-26C0-8B45-BC00-59DC2F9C0320}" type="datetimeFigureOut">
               <a:rPr lang="en-US" smtClean="0"/>
-              <a:t>4/23/16</a:t>
+              <a:t>4/25/16</a:t>
             </a:fld>
             <a:endParaRPr lang="en-US"/>
           </a:p>
@@ -6881,7 +6881,7 @@
           <a:p>
             <a:fld id="{2DBD2FC0-26C0-8B45-BC00-59DC2F9C0320}" type="datetimeFigureOut">
               <a:rPr lang="en-US" smtClean="0"/>
-              <a:t>4/23/16</a:t>
+              <a:t>4/25/16</a:t>
             </a:fld>
             <a:endParaRPr lang="en-US"/>
           </a:p>
@@ -7488,6 +7488,13 @@
   <p:clrMapOvr>
     <a:masterClrMapping/>
   </p:clrMapOvr>
+  <p:timing>
+    <p:tnLst>
+      <p:par>
+        <p:cTn id="1" dur="indefinite" restart="never" nodeType="tmRoot"/>
+      </p:par>
+    </p:tnLst>
+  </p:timing>
 </p:sld>
 </file>
 
@@ -9075,6 +9082,13 @@
   <p:clrMapOvr>
     <a:masterClrMapping/>
   </p:clrMapOvr>
+  <p:timing>
+    <p:tnLst>
+      <p:par>
+        <p:cTn id="1" dur="indefinite" restart="never" nodeType="tmRoot"/>
+      </p:par>
+    </p:tnLst>
+  </p:timing>
 </p:sld>
 </file>
 
@@ -10859,6 +10873,13 @@
   <p:clrMapOvr>
     <a:masterClrMapping/>
   </p:clrMapOvr>
+  <p:timing>
+    <p:tnLst>
+      <p:par>
+        <p:cTn id="1" dur="indefinite" restart="never" nodeType="tmRoot"/>
+      </p:par>
+    </p:tnLst>
+  </p:timing>
 </p:sld>
 </file>
 
@@ -11986,6 +12007,13 @@
   <p:clrMapOvr>
     <a:masterClrMapping/>
   </p:clrMapOvr>
+  <p:timing>
+    <p:tnLst>
+      <p:par>
+        <p:cTn id="1" dur="indefinite" restart="never" nodeType="tmRoot"/>
+      </p:par>
+    </p:tnLst>
+  </p:timing>
 </p:sld>
 </file>
 
@@ -13451,6 +13479,13 @@
   <p:clrMapOvr>
     <a:masterClrMapping/>
   </p:clrMapOvr>
+  <p:timing>
+    <p:tnLst>
+      <p:par>
+        <p:cTn id="1" dur="indefinite" restart="never" nodeType="tmRoot"/>
+      </p:par>
+    </p:tnLst>
+  </p:timing>
 </p:sld>
 </file>
 
@@ -14630,6 +14665,13 @@
   <p:clrMapOvr>
     <a:masterClrMapping/>
   </p:clrMapOvr>
+  <p:timing>
+    <p:tnLst>
+      <p:par>
+        <p:cTn id="1" dur="indefinite" restart="never" nodeType="tmRoot"/>
+      </p:par>
+    </p:tnLst>
+  </p:timing>
 </p:sld>
 </file>
 
@@ -15717,6 +15759,13 @@
   <p:clrMapOvr>
     <a:masterClrMapping/>
   </p:clrMapOvr>
+  <p:timing>
+    <p:tnLst>
+      <p:par>
+        <p:cTn id="1" dur="indefinite" restart="never" nodeType="tmRoot"/>
+      </p:par>
+    </p:tnLst>
+  </p:timing>
 </p:sld>
 </file>
 
@@ -16780,6 +16829,13 @@
   <p:clrMapOvr>
     <a:masterClrMapping/>
   </p:clrMapOvr>
+  <p:timing>
+    <p:tnLst>
+      <p:par>
+        <p:cTn id="1" dur="indefinite" restart="never" nodeType="tmRoot"/>
+      </p:par>
+    </p:tnLst>
+  </p:timing>
 </p:sld>
 </file>
 
@@ -17854,6 +17910,13 @@
   <p:clrMapOvr>
     <a:masterClrMapping/>
   </p:clrMapOvr>
+  <p:timing>
+    <p:tnLst>
+      <p:par>
+        <p:cTn id="1" dur="indefinite" restart="never" nodeType="tmRoot"/>
+      </p:par>
+    </p:tnLst>
+  </p:timing>
 </p:sld>
 </file>
 
@@ -17934,6 +17997,13 @@
   <p:clrMapOvr>
     <a:masterClrMapping/>
   </p:clrMapOvr>
+  <p:timing>
+    <p:tnLst>
+      <p:par>
+        <p:cTn id="1" dur="indefinite" restart="never" nodeType="tmRoot"/>
+      </p:par>
+    </p:tnLst>
+  </p:timing>
 </p:sld>
 </file>
 
@@ -18072,6 +18142,13 @@
   <p:clrMapOvr>
     <a:masterClrMapping/>
   </p:clrMapOvr>
+  <p:timing>
+    <p:tnLst>
+      <p:par>
+        <p:cTn id="1" dur="indefinite" restart="never" nodeType="tmRoot"/>
+      </p:par>
+    </p:tnLst>
+  </p:timing>
 </p:sld>
 </file>
 
@@ -18125,15 +18202,25 @@
             <p:ph idx="1"/>
           </p:nvPr>
         </p:nvSpPr>
-        <p:spPr/>
+        <p:spPr>
+          <a:xfrm>
+            <a:off x="554180" y="2403763"/>
+            <a:ext cx="6508377" cy="3916363"/>
+          </a:xfrm>
+        </p:spPr>
         <p:txBody>
           <a:bodyPr/>
           <a:lstStyle/>
           <a:p>
             <a:r>
               <a:rPr lang="en-US" dirty="0" smtClean="0"/>
-              <a:t>Alejandro Solis</a:t>
-            </a:r>
+              <a:t>Alejandro </a:t>
+            </a:r>
+            <a:r>
+              <a:rPr lang="en-US" dirty="0" smtClean="0"/>
+              <a:t>Solis (DAI)</a:t>
+            </a:r>
+            <a:endParaRPr lang="en-US" dirty="0" smtClean="0"/>
           </a:p>
           <a:p>
             <a:r>
@@ -18156,8 +18243,23 @@
           <a:p>
             <a:r>
               <a:rPr lang="en-US" dirty="0" smtClean="0"/>
-              <a:t>Francisco Delgado</a:t>
-            </a:r>
+              <a:t>Francisco </a:t>
+            </a:r>
+            <a:r>
+              <a:rPr lang="en-US" dirty="0" smtClean="0"/>
+              <a:t>Delgado (SERVIR-USRA)</a:t>
+            </a:r>
+          </a:p>
+          <a:p>
+            <a:r>
+              <a:rPr lang="en-US" dirty="0" err="1" smtClean="0"/>
+              <a:t>Deisy</a:t>
+            </a:r>
+            <a:r>
+              <a:rPr lang="en-US" dirty="0" smtClean="0"/>
+              <a:t> Lopez-Ramos (CATIE)</a:t>
+            </a:r>
+            <a:endParaRPr lang="en-US" dirty="0" smtClean="0"/>
           </a:p>
           <a:p>
             <a:endParaRPr lang="en-US" dirty="0"/>
@@ -18174,6 +18276,13 @@
   <p:clrMapOvr>
     <a:masterClrMapping/>
   </p:clrMapOvr>
+  <p:timing>
+    <p:tnLst>
+      <p:par>
+        <p:cTn id="1" dur="indefinite" restart="never" nodeType="tmRoot"/>
+      </p:par>
+    </p:tnLst>
+  </p:timing>
 </p:sld>
 </file>
 
@@ -18480,6 +18589,13 @@
   <p:clrMapOvr>
     <a:masterClrMapping/>
   </p:clrMapOvr>
+  <p:timing>
+    <p:tnLst>
+      <p:par>
+        <p:cTn id="1" dur="indefinite" restart="never" nodeType="tmRoot"/>
+      </p:par>
+    </p:tnLst>
+  </p:timing>
 </p:sld>
 </file>
 
@@ -18601,7 +18717,15 @@
             </a:r>
             <a:r>
               <a:rPr lang="en-US" dirty="0" smtClean="0"/>
-              <a:t> --region d02 --date 2016-04-15 --v</a:t>
+              <a:t> --region d02 --date 2016-04-15 </a:t>
+            </a:r>
+            <a:r>
+              <a:rPr lang="en-US" dirty="0" smtClean="0"/>
+              <a:t>-</a:t>
+            </a:r>
+            <a:r>
+              <a:rPr lang="en-US" dirty="0" smtClean="0"/>
+              <a:t>v</a:t>
             </a:r>
           </a:p>
           <a:p>
@@ -18623,7 +18747,11 @@
             </a:r>
             <a:r>
               <a:rPr lang="en-US" dirty="0" smtClean="0"/>
-              <a:t>--v</a:t>
+              <a:t>-</a:t>
+            </a:r>
+            <a:r>
+              <a:rPr lang="en-US" dirty="0" smtClean="0"/>
+              <a:t>v</a:t>
             </a:r>
             <a:endParaRPr lang="en-US" dirty="0"/>
           </a:p>
@@ -18650,7 +18778,15 @@
             </a:r>
             <a:r>
               <a:rPr lang="en-US" dirty="0" smtClean="0"/>
-              <a:t>--date 2016-04-15 --v</a:t>
+              <a:t>--date 2016-04-15 </a:t>
+            </a:r>
+            <a:r>
+              <a:rPr lang="en-US" dirty="0" smtClean="0"/>
+              <a:t>-</a:t>
+            </a:r>
+            <a:r>
+              <a:rPr lang="en-US" dirty="0" smtClean="0"/>
+              <a:t>v</a:t>
             </a:r>
           </a:p>
           <a:p>
@@ -18672,7 +18808,15 @@
             </a:r>
             <a:r>
               <a:rPr lang="en-US" dirty="0" smtClean="0"/>
-              <a:t>2016-04-15 --v</a:t>
+              <a:t>2016-04-15 </a:t>
+            </a:r>
+            <a:r>
+              <a:rPr lang="en-US" dirty="0" smtClean="0"/>
+              <a:t>-</a:t>
+            </a:r>
+            <a:r>
+              <a:rPr lang="en-US" dirty="0" smtClean="0"/>
+              <a:t>v</a:t>
             </a:r>
           </a:p>
           <a:p>
@@ -18701,9 +18845,14 @@
               <a:t>d02 --date 2016-04-15 </a:t>
             </a:r>
             <a:r>
+              <a:rPr lang="en-US" dirty="0"/>
+              <a:t>-</a:t>
+            </a:r>
+            <a:r>
               <a:rPr lang="en-US" dirty="0" smtClean="0"/>
-              <a:t>–v</a:t>
-            </a:r>
+              <a:t>v</a:t>
+            </a:r>
+            <a:endParaRPr lang="en-US" dirty="0" smtClean="0"/>
           </a:p>
           <a:p>
             <a:r>
@@ -18724,11 +18873,19 @@
             </a:r>
             <a:r>
               <a:rPr lang="en-US" dirty="0" smtClean="0"/>
-              <a:t> -</a:t>
+              <a:t> </a:t>
+            </a:r>
+            <a:r>
+              <a:rPr lang="en-US" dirty="0" smtClean="0"/>
+              <a:t>--region </a:t>
             </a:r>
             <a:r>
               <a:rPr lang="en-US" dirty="0"/>
-              <a:t>region d02 --date 2016-04-15 --</a:t>
+              <a:t>d02 --date 2016-04-15 </a:t>
+            </a:r>
+            <a:r>
+              <a:rPr lang="en-US" dirty="0" smtClean="0"/>
+              <a:t>-</a:t>
             </a:r>
             <a:r>
               <a:rPr lang="en-US" dirty="0" smtClean="0"/>
@@ -18766,6 +18923,13 @@
   <p:clrMapOvr>
     <a:masterClrMapping/>
   </p:clrMapOvr>
+  <p:timing>
+    <p:tnLst>
+      <p:par>
+        <p:cTn id="1" dur="indefinite" restart="never" nodeType="tmRoot"/>
+      </p:par>
+    </p:tnLst>
+  </p:timing>
 </p:sld>
 </file>
 
@@ -19443,6 +19607,13 @@
   <p:clrMapOvr>
     <a:masterClrMapping/>
   </p:clrMapOvr>
+  <p:timing>
+    <p:tnLst>
+      <p:par>
+        <p:cTn id="1" dur="indefinite" restart="never" nodeType="tmRoot"/>
+      </p:par>
+    </p:tnLst>
+  </p:timing>
 </p:sld>
 </file>
 
@@ -19523,6 +19694,13 @@
   <p:clrMapOvr>
     <a:masterClrMapping/>
   </p:clrMapOvr>
+  <p:timing>
+    <p:tnLst>
+      <p:par>
+        <p:cTn id="1" dur="indefinite" restart="never" nodeType="tmRoot"/>
+      </p:par>
+    </p:tnLst>
+  </p:timing>
 </p:sld>
 </file>
 
@@ -19817,6 +19995,13 @@
   <p:clrMapOvr>
     <a:masterClrMapping/>
   </p:clrMapOvr>
+  <p:timing>
+    <p:tnLst>
+      <p:par>
+        <p:cTn id="1" dur="indefinite" restart="never" nodeType="tmRoot"/>
+      </p:par>
+    </p:tnLst>
+  </p:timing>
 </p:sld>
 </file>
 
@@ -19967,6 +20152,13 @@
   <p:clrMapOvr>
     <a:masterClrMapping/>
   </p:clrMapOvr>
+  <p:timing>
+    <p:tnLst>
+      <p:par>
+        <p:cTn id="1" dur="indefinite" restart="never" nodeType="tmRoot"/>
+      </p:par>
+    </p:tnLst>
+  </p:timing>
 </p:sld>
 </file>
 
@@ -20047,6 +20239,13 @@
   <p:clrMapOvr>
     <a:masterClrMapping/>
   </p:clrMapOvr>
+  <p:timing>
+    <p:tnLst>
+      <p:par>
+        <p:cTn id="1" dur="indefinite" restart="never" nodeType="tmRoot"/>
+      </p:par>
+    </p:tnLst>
+  </p:timing>
 </p:sld>
 </file>
 
@@ -20197,6 +20396,13 @@
   <p:clrMapOvr>
     <a:masterClrMapping/>
   </p:clrMapOvr>
+  <p:timing>
+    <p:tnLst>
+      <p:par>
+        <p:cTn id="1" dur="indefinite" restart="never" nodeType="tmRoot"/>
+      </p:par>
+    </p:tnLst>
+  </p:timing>
 </p:sld>
 </file>
 
@@ -20277,6 +20483,13 @@
   <p:clrMapOvr>
     <a:masterClrMapping/>
   </p:clrMapOvr>
+  <p:timing>
+    <p:tnLst>
+      <p:par>
+        <p:cTn id="1" dur="indefinite" restart="never" nodeType="tmRoot"/>
+      </p:par>
+    </p:tnLst>
+  </p:timing>
 </p:sld>
 </file>
 
@@ -20432,6 +20645,13 @@
   <p:clrMapOvr>
     <a:masterClrMapping/>
   </p:clrMapOvr>
+  <p:timing>
+    <p:tnLst>
+      <p:par>
+        <p:cTn id="1" dur="indefinite" restart="never" nodeType="tmRoot"/>
+      </p:par>
+    </p:tnLst>
+  </p:timing>
 </p:sld>
 </file>
 
@@ -20658,6 +20878,13 @@
   <p:clrMapOvr>
     <a:masterClrMapping/>
   </p:clrMapOvr>
+  <p:timing>
+    <p:tnLst>
+      <p:par>
+        <p:cTn id="1" dur="indefinite" restart="never" nodeType="tmRoot"/>
+      </p:par>
+    </p:tnLst>
+  </p:timing>
 </p:sld>
 </file>
 
@@ -20739,6 +20966,13 @@
   <p:clrMapOvr>
     <a:masterClrMapping/>
   </p:clrMapOvr>
+  <p:timing>
+    <p:tnLst>
+      <p:par>
+        <p:cTn id="1" dur="indefinite" restart="never" nodeType="tmRoot"/>
+      </p:par>
+    </p:tnLst>
+  </p:timing>
 </p:sld>
 </file>
 
@@ -21952,6 +22186,13 @@
   <p:clrMapOvr>
     <a:masterClrMapping/>
   </p:clrMapOvr>
+  <p:timing>
+    <p:tnLst>
+      <p:par>
+        <p:cTn id="1" dur="indefinite" restart="never" nodeType="tmRoot"/>
+      </p:par>
+    </p:tnLst>
+  </p:timing>
 </p:sld>
 </file>
 
@@ -22741,6 +22982,13 @@
   <p:clrMapOvr>
     <a:masterClrMapping/>
   </p:clrMapOvr>
+  <p:timing>
+    <p:tnLst>
+      <p:par>
+        <p:cTn id="1" dur="indefinite" restart="never" nodeType="tmRoot"/>
+      </p:par>
+    </p:tnLst>
+  </p:timing>
 </p:sld>
 </file>
 
@@ -22860,6 +23108,13 @@
   <p:clrMapOvr>
     <a:masterClrMapping/>
   </p:clrMapOvr>
+  <p:timing>
+    <p:tnLst>
+      <p:par>
+        <p:cTn id="1" dur="indefinite" restart="never" nodeType="tmRoot"/>
+      </p:par>
+    </p:tnLst>
+  </p:timing>
 </p:sld>
 </file>
 
@@ -23928,6 +24183,13 @@
   <p:clrMapOvr>
     <a:masterClrMapping/>
   </p:clrMapOvr>
+  <p:timing>
+    <p:tnLst>
+      <p:par>
+        <p:cTn id="1" dur="indefinite" restart="never" nodeType="tmRoot"/>
+      </p:par>
+    </p:tnLst>
+  </p:timing>
 </p:sld>
 </file>
 
@@ -24150,6 +24412,13 @@
   <p:clrMapOvr>
     <a:masterClrMapping/>
   </p:clrMapOvr>
+  <p:timing>
+    <p:tnLst>
+      <p:par>
+        <p:cTn id="1" dur="indefinite" restart="never" nodeType="tmRoot"/>
+      </p:par>
+    </p:tnLst>
+  </p:timing>
 </p:sld>
 </file>
 
@@ -24226,6 +24495,13 @@
   <p:clrMapOvr>
     <a:masterClrMapping/>
   </p:clrMapOvr>
+  <p:timing>
+    <p:tnLst>
+      <p:par>
+        <p:cTn id="1" dur="indefinite" restart="never" nodeType="tmRoot"/>
+      </p:par>
+    </p:tnLst>
+  </p:timing>
 </p:sld>
 </file>
 

</xml_diff>

<commit_message>
dded susmap.2 in data
</commit_message>
<xml_diff>
--- a/ECA-RCCP-WorshopApr2016.pptx
+++ b/ECA-RCCP-WorshopApr2016.pptx
@@ -246,7 +246,7 @@
           <a:p>
             <a:fld id="{6E04E453-D430-B44E-9EFF-220B3399F38E}" type="datetimeFigureOut">
               <a:rPr lang="en-US" smtClean="0"/>
-              <a:t>4/25/16</a:t>
+              <a:t>4/26/16</a:t>
             </a:fld>
             <a:endParaRPr lang="en-US"/>
           </a:p>
@@ -952,7 +952,7 @@
           <a:p>
             <a:fld id="{2DBD2FC0-26C0-8B45-BC00-59DC2F9C0320}" type="datetimeFigureOut">
               <a:rPr lang="en-US" smtClean="0"/>
-              <a:t>4/25/16</a:t>
+              <a:t>4/26/16</a:t>
             </a:fld>
             <a:endParaRPr lang="en-US"/>
           </a:p>
@@ -1238,7 +1238,7 @@
           <a:p>
             <a:fld id="{2DBD2FC0-26C0-8B45-BC00-59DC2F9C0320}" type="datetimeFigureOut">
               <a:rPr lang="en-US" smtClean="0"/>
-              <a:t>4/25/16</a:t>
+              <a:t>4/26/16</a:t>
             </a:fld>
             <a:endParaRPr lang="en-US"/>
           </a:p>
@@ -1660,7 +1660,7 @@
           <a:p>
             <a:fld id="{2DBD2FC0-26C0-8B45-BC00-59DC2F9C0320}" type="datetimeFigureOut">
               <a:rPr lang="en-US" smtClean="0"/>
-              <a:t>4/25/16</a:t>
+              <a:t>4/26/16</a:t>
             </a:fld>
             <a:endParaRPr lang="en-US"/>
           </a:p>
@@ -2077,7 +2077,7 @@
           <a:p>
             <a:fld id="{2DBD2FC0-26C0-8B45-BC00-59DC2F9C0320}" type="datetimeFigureOut">
               <a:rPr lang="en-US" smtClean="0"/>
-              <a:t>4/25/16</a:t>
+              <a:t>4/26/16</a:t>
             </a:fld>
             <a:endParaRPr lang="en-US"/>
           </a:p>
@@ -2210,7 +2210,7 @@
           <a:p>
             <a:fld id="{2DBD2FC0-26C0-8B45-BC00-59DC2F9C0320}" type="datetimeFigureOut">
               <a:rPr lang="en-US" smtClean="0"/>
-              <a:t>4/25/16</a:t>
+              <a:t>4/26/16</a:t>
             </a:fld>
             <a:endParaRPr lang="en-US"/>
           </a:p>
@@ -2532,7 +2532,7 @@
           <a:p>
             <a:fld id="{2DBD2FC0-26C0-8B45-BC00-59DC2F9C0320}" type="datetimeFigureOut">
               <a:rPr lang="en-US" smtClean="0"/>
-              <a:t>4/25/16</a:t>
+              <a:t>4/26/16</a:t>
             </a:fld>
             <a:endParaRPr lang="en-US"/>
           </a:p>
@@ -2776,7 +2776,7 @@
           <a:p>
             <a:fld id="{2DBD2FC0-26C0-8B45-BC00-59DC2F9C0320}" type="datetimeFigureOut">
               <a:rPr lang="en-US" smtClean="0"/>
-              <a:t>4/25/16</a:t>
+              <a:t>4/26/16</a:t>
             </a:fld>
             <a:endParaRPr lang="en-US"/>
           </a:p>
@@ -3114,7 +3114,7 @@
           <a:p>
             <a:fld id="{2DBD2FC0-26C0-8B45-BC00-59DC2F9C0320}" type="datetimeFigureOut">
               <a:rPr lang="en-US" smtClean="0"/>
-              <a:t>4/25/16</a:t>
+              <a:t>4/26/16</a:t>
             </a:fld>
             <a:endParaRPr lang="en-US"/>
           </a:p>
@@ -3414,7 +3414,7 @@
           <a:p>
             <a:fld id="{2DBD2FC0-26C0-8B45-BC00-59DC2F9C0320}" type="datetimeFigureOut">
               <a:rPr lang="en-US" smtClean="0"/>
-              <a:t>4/25/16</a:t>
+              <a:t>4/26/16</a:t>
             </a:fld>
             <a:endParaRPr lang="en-US"/>
           </a:p>
@@ -3821,7 +3821,7 @@
           <a:p>
             <a:fld id="{2DBD2FC0-26C0-8B45-BC00-59DC2F9C0320}" type="datetimeFigureOut">
               <a:rPr lang="en-US" smtClean="0"/>
-              <a:t>4/25/16</a:t>
+              <a:t>4/26/16</a:t>
             </a:fld>
             <a:endParaRPr lang="en-US"/>
           </a:p>
@@ -4043,7 +4043,7 @@
           <a:p>
             <a:fld id="{2DBD2FC0-26C0-8B45-BC00-59DC2F9C0320}" type="datetimeFigureOut">
               <a:rPr lang="en-US" smtClean="0"/>
-              <a:t>4/25/16</a:t>
+              <a:t>4/26/16</a:t>
             </a:fld>
             <a:endParaRPr lang="en-US"/>
           </a:p>
@@ -4260,7 +4260,7 @@
           <a:p>
             <a:fld id="{2DBD2FC0-26C0-8B45-BC00-59DC2F9C0320}" type="datetimeFigureOut">
               <a:rPr lang="en-US" smtClean="0"/>
-              <a:t>4/25/16</a:t>
+              <a:t>4/26/16</a:t>
             </a:fld>
             <a:endParaRPr lang="en-US"/>
           </a:p>
@@ -4565,7 +4565,7 @@
           <a:p>
             <a:fld id="{2DBD2FC0-26C0-8B45-BC00-59DC2F9C0320}" type="datetimeFigureOut">
               <a:rPr lang="en-US" smtClean="0"/>
-              <a:t>4/25/16</a:t>
+              <a:t>4/26/16</a:t>
             </a:fld>
             <a:endParaRPr lang="en-US"/>
           </a:p>
@@ -4892,7 +4892,7 @@
           <a:p>
             <a:fld id="{2DBD2FC0-26C0-8B45-BC00-59DC2F9C0320}" type="datetimeFigureOut">
               <a:rPr lang="en-US" smtClean="0"/>
-              <a:t>4/25/16</a:t>
+              <a:t>4/26/16</a:t>
             </a:fld>
             <a:endParaRPr lang="en-US"/>
           </a:p>
@@ -5227,7 +5227,7 @@
           <a:p>
             <a:fld id="{2DBD2FC0-26C0-8B45-BC00-59DC2F9C0320}" type="datetimeFigureOut">
               <a:rPr lang="en-US" smtClean="0"/>
-              <a:t>4/25/16</a:t>
+              <a:t>4/26/16</a:t>
             </a:fld>
             <a:endParaRPr lang="en-US"/>
           </a:p>
@@ -5850,7 +5850,7 @@
           <a:p>
             <a:fld id="{2DBD2FC0-26C0-8B45-BC00-59DC2F9C0320}" type="datetimeFigureOut">
               <a:rPr lang="en-US" smtClean="0"/>
-              <a:t>4/25/16</a:t>
+              <a:t>4/26/16</a:t>
             </a:fld>
             <a:endParaRPr lang="en-US"/>
           </a:p>
@@ -6337,7 +6337,7 @@
           <a:p>
             <a:fld id="{2DBD2FC0-26C0-8B45-BC00-59DC2F9C0320}" type="datetimeFigureOut">
               <a:rPr lang="en-US" smtClean="0"/>
-              <a:t>4/25/16</a:t>
+              <a:t>4/26/16</a:t>
             </a:fld>
             <a:endParaRPr lang="en-US"/>
           </a:p>
@@ -6585,7 +6585,7 @@
           <a:p>
             <a:fld id="{2DBD2FC0-26C0-8B45-BC00-59DC2F9C0320}" type="datetimeFigureOut">
               <a:rPr lang="en-US" smtClean="0"/>
-              <a:t>4/25/16</a:t>
+              <a:t>4/26/16</a:t>
             </a:fld>
             <a:endParaRPr lang="en-US"/>
           </a:p>
@@ -6881,7 +6881,7 @@
           <a:p>
             <a:fld id="{2DBD2FC0-26C0-8B45-BC00-59DC2F9C0320}" type="datetimeFigureOut">
               <a:rPr lang="en-US" smtClean="0"/>
-              <a:t>4/25/16</a:t>
+              <a:t>4/26/16</a:t>
             </a:fld>
             <a:endParaRPr lang="en-US"/>
           </a:p>
@@ -18214,40 +18214,61 @@
           <a:p>
             <a:r>
               <a:rPr lang="en-US" dirty="0" smtClean="0"/>
-              <a:t>Alejandro </a:t>
-            </a:r>
+              <a:t>Alejandro Solis (DAI)</a:t>
+            </a:r>
+          </a:p>
+          <a:p>
             <a:r>
               <a:rPr lang="en-US" dirty="0" smtClean="0"/>
-              <a:t>Solis (DAI)</a:t>
+              <a:t>Augusto </a:t>
+            </a:r>
+            <a:r>
+              <a:rPr lang="en-US" dirty="0" smtClean="0"/>
+              <a:t>Valerio (DAI)</a:t>
             </a:r>
             <a:endParaRPr lang="en-US" dirty="0" smtClean="0"/>
           </a:p>
           <a:p>
             <a:r>
               <a:rPr lang="en-US" dirty="0" smtClean="0"/>
-              <a:t>Augusto Valerio</a:t>
-            </a:r>
+              <a:t>David </a:t>
+            </a:r>
+            <a:r>
+              <a:rPr lang="en-US" smtClean="0"/>
+              <a:t>Eliseo Martinez (Consultant)</a:t>
+            </a:r>
+            <a:endParaRPr lang="en-US" dirty="0" smtClean="0"/>
           </a:p>
           <a:p>
             <a:r>
               <a:rPr lang="en-US" dirty="0" smtClean="0"/>
-              <a:t>Eliseo Martinez</a:t>
-            </a:r>
-          </a:p>
-          <a:p>
+              <a:t>David </a:t>
+            </a:r>
+            <a:r>
+              <a:rPr lang="en-US" dirty="0" err="1" smtClean="0"/>
+              <a:t>Pichinte</a:t>
+            </a:r>
             <a:r>
               <a:rPr lang="en-US" dirty="0" smtClean="0"/>
-              <a:t>Amides Figueroa</a:t>
-            </a:r>
+              <a:t> (MARN)</a:t>
+            </a:r>
+            <a:endParaRPr lang="en-US" dirty="0" smtClean="0"/>
           </a:p>
           <a:p>
             <a:r>
               <a:rPr lang="en-US" dirty="0" smtClean="0"/>
-              <a:t>Francisco </a:t>
+              <a:t>Amides </a:t>
             </a:r>
             <a:r>
               <a:rPr lang="en-US" dirty="0" smtClean="0"/>
-              <a:t>Delgado (SERVIR-USRA)</a:t>
+              <a:t>Figueroa (consultant)</a:t>
+            </a:r>
+            <a:endParaRPr lang="en-US" dirty="0" smtClean="0"/>
+          </a:p>
+          <a:p>
+            <a:r>
+              <a:rPr lang="en-US" dirty="0" smtClean="0"/>
+              <a:t>Francisco Delgado (SERVIR-USRA)</a:t>
             </a:r>
           </a:p>
           <a:p>
@@ -18259,7 +18280,6 @@
               <a:rPr lang="en-US" dirty="0" smtClean="0"/>
               <a:t> Lopez-Ramos (CATIE)</a:t>
             </a:r>
-            <a:endParaRPr lang="en-US" dirty="0" smtClean="0"/>
           </a:p>
           <a:p>
             <a:endParaRPr lang="en-US" dirty="0"/>
@@ -18717,11 +18737,104 @@
             </a:r>
             <a:r>
               <a:rPr lang="en-US" dirty="0" smtClean="0"/>
-              <a:t> --region d02 --date 2016-04-15 </a:t>
+              <a:t> --region d02 --date 2016-04-15 -v</a:t>
+            </a:r>
+          </a:p>
+          <a:p>
+            <a:r>
+              <a:rPr lang="en-US" dirty="0"/>
+              <a:t>$ python </a:t>
+            </a:r>
+            <a:r>
+              <a:rPr lang="en-US" dirty="0" err="1" smtClean="0"/>
+              <a:t>trmm_process.py</a:t>
             </a:r>
             <a:r>
               <a:rPr lang="en-US" dirty="0" smtClean="0"/>
-              <a:t>-</a:t>
+              <a:t> --region </a:t>
+            </a:r>
+            <a:r>
+              <a:rPr lang="en-US" dirty="0"/>
+              <a:t>d02 --date 2016-04-15 </a:t>
+            </a:r>
+            <a:r>
+              <a:rPr lang="en-US" dirty="0" smtClean="0"/>
+              <a:t>-v</a:t>
+            </a:r>
+            <a:endParaRPr lang="en-US" dirty="0"/>
+          </a:p>
+          <a:p>
+            <a:r>
+              <a:rPr lang="en-US" dirty="0" smtClean="0"/>
+              <a:t>$ </a:t>
+            </a:r>
+            <a:r>
+              <a:rPr lang="en-US" dirty="0"/>
+              <a:t>python </a:t>
+            </a:r>
+            <a:r>
+              <a:rPr lang="en-US" dirty="0" err="1" smtClean="0"/>
+              <a:t>gpm_process.py</a:t>
+            </a:r>
+            <a:r>
+              <a:rPr lang="en-US" dirty="0" smtClean="0"/>
+              <a:t> --</a:t>
+            </a:r>
+            <a:r>
+              <a:rPr lang="en-US" dirty="0"/>
+              <a:t>region d02 </a:t>
+            </a:r>
+            <a:r>
+              <a:rPr lang="en-US" dirty="0" smtClean="0"/>
+              <a:t>--date 2016-04-15 -v</a:t>
+            </a:r>
+          </a:p>
+          <a:p>
+            <a:r>
+              <a:rPr lang="en-US" dirty="0"/>
+              <a:t>$ python </a:t>
+            </a:r>
+            <a:r>
+              <a:rPr lang="en-US" dirty="0" err="1" smtClean="0"/>
+              <a:t>landslide_nowcast.py</a:t>
+            </a:r>
+            <a:r>
+              <a:rPr lang="en-US" dirty="0" smtClean="0"/>
+              <a:t> --region </a:t>
+            </a:r>
+            <a:r>
+              <a:rPr lang="en-US" dirty="0"/>
+              <a:t>d02 --date </a:t>
+            </a:r>
+            <a:r>
+              <a:rPr lang="en-US" dirty="0" smtClean="0"/>
+              <a:t>2016-04-15 -v</a:t>
+            </a:r>
+          </a:p>
+          <a:p>
+            <a:r>
+              <a:rPr lang="en-US" dirty="0"/>
+              <a:t>$ python </a:t>
+            </a:r>
+            <a:r>
+              <a:rPr lang="en-US" dirty="0" err="1" smtClean="0"/>
+              <a:t>modis</a:t>
+            </a:r>
+            <a:r>
+              <a:rPr lang="en-US" dirty="0" smtClean="0"/>
+              <a:t>-active-</a:t>
+            </a:r>
+            <a:r>
+              <a:rPr lang="en-US" dirty="0" err="1" smtClean="0"/>
+              <a:t>fires.py</a:t>
+            </a:r>
+            <a:r>
+              <a:rPr lang="en-US" dirty="0" smtClean="0"/>
+              <a:t> --region </a:t>
+            </a:r>
+            <a:r>
+              <a:rPr lang="en-US" dirty="0"/>
+              <a:t>d02 --date 2016-04-15 -</a:t>
             </a:r>
             <a:r>
               <a:rPr lang="en-US" dirty="0" smtClean="0"/>
@@ -18735,7 +18848,15 @@
             </a:r>
             <a:r>
               <a:rPr lang="en-US" dirty="0" err="1" smtClean="0"/>
-              <a:t>trmm_process.py</a:t>
+              <a:t>viirs</a:t>
+            </a:r>
+            <a:r>
+              <a:rPr lang="en-US" dirty="0" smtClean="0"/>
+              <a:t>-active-</a:t>
+            </a:r>
+            <a:r>
+              <a:rPr lang="en-US" dirty="0" err="1" smtClean="0"/>
+              <a:t>fires.py</a:t>
             </a:r>
             <a:r>
               <a:rPr lang="en-US" dirty="0" smtClean="0"/>
@@ -18747,149 +18868,7 @@
             </a:r>
             <a:r>
               <a:rPr lang="en-US" dirty="0" smtClean="0"/>
-              <a:t>-</a:t>
-            </a:r>
-            <a:r>
-              <a:rPr lang="en-US" dirty="0" smtClean="0"/>
-              <a:t>v</a:t>
-            </a:r>
-            <a:endParaRPr lang="en-US" dirty="0"/>
-          </a:p>
-          <a:p>
-            <a:r>
-              <a:rPr lang="en-US" dirty="0" smtClean="0"/>
-              <a:t>$ </a:t>
-            </a:r>
-            <a:r>
-              <a:rPr lang="en-US" dirty="0"/>
-              <a:t>python </a:t>
-            </a:r>
-            <a:r>
-              <a:rPr lang="en-US" dirty="0" err="1" smtClean="0"/>
-              <a:t>gpm_process.py</a:t>
-            </a:r>
-            <a:r>
-              <a:rPr lang="en-US" dirty="0" smtClean="0"/>
-              <a:t> --</a:t>
-            </a:r>
-            <a:r>
-              <a:rPr lang="en-US" dirty="0"/>
-              <a:t>region d02 </a:t>
-            </a:r>
-            <a:r>
-              <a:rPr lang="en-US" dirty="0" smtClean="0"/>
-              <a:t>--date 2016-04-15 </a:t>
-            </a:r>
-            <a:r>
-              <a:rPr lang="en-US" dirty="0" smtClean="0"/>
-              <a:t>-</a:t>
-            </a:r>
-            <a:r>
-              <a:rPr lang="en-US" dirty="0" smtClean="0"/>
-              <a:t>v</a:t>
-            </a:r>
-          </a:p>
-          <a:p>
-            <a:r>
-              <a:rPr lang="en-US" dirty="0"/>
-              <a:t>$ python </a:t>
-            </a:r>
-            <a:r>
-              <a:rPr lang="en-US" dirty="0" err="1" smtClean="0"/>
-              <a:t>landslide_nowcast.py</a:t>
-            </a:r>
-            <a:r>
-              <a:rPr lang="en-US" dirty="0" smtClean="0"/>
-              <a:t> --region </a:t>
-            </a:r>
-            <a:r>
-              <a:rPr lang="en-US" dirty="0"/>
-              <a:t>d02 --date </a:t>
-            </a:r>
-            <a:r>
-              <a:rPr lang="en-US" dirty="0" smtClean="0"/>
-              <a:t>2016-04-15 </a:t>
-            </a:r>
-            <a:r>
-              <a:rPr lang="en-US" dirty="0" smtClean="0"/>
-              <a:t>-</a:t>
-            </a:r>
-            <a:r>
-              <a:rPr lang="en-US" dirty="0" smtClean="0"/>
-              <a:t>v</a:t>
-            </a:r>
-          </a:p>
-          <a:p>
-            <a:r>
-              <a:rPr lang="en-US" dirty="0"/>
-              <a:t>$ python </a:t>
-            </a:r>
-            <a:r>
-              <a:rPr lang="en-US" dirty="0" err="1" smtClean="0"/>
-              <a:t>modis</a:t>
-            </a:r>
-            <a:r>
-              <a:rPr lang="en-US" dirty="0" smtClean="0"/>
-              <a:t>-active-</a:t>
-            </a:r>
-            <a:r>
-              <a:rPr lang="en-US" dirty="0" err="1" smtClean="0"/>
-              <a:t>fires.py</a:t>
-            </a:r>
-            <a:r>
-              <a:rPr lang="en-US" dirty="0" smtClean="0"/>
-              <a:t> --region </a:t>
-            </a:r>
-            <a:r>
-              <a:rPr lang="en-US" dirty="0"/>
-              <a:t>d02 --date 2016-04-15 </a:t>
-            </a:r>
-            <a:r>
-              <a:rPr lang="en-US" dirty="0"/>
-              <a:t>-</a:t>
-            </a:r>
-            <a:r>
-              <a:rPr lang="en-US" dirty="0" smtClean="0"/>
-              <a:t>v</a:t>
-            </a:r>
-            <a:endParaRPr lang="en-US" dirty="0" smtClean="0"/>
-          </a:p>
-          <a:p>
-            <a:r>
-              <a:rPr lang="en-US" dirty="0"/>
-              <a:t>$ python </a:t>
-            </a:r>
-            <a:r>
-              <a:rPr lang="en-US" dirty="0" err="1" smtClean="0"/>
-              <a:t>viirs</a:t>
-            </a:r>
-            <a:r>
-              <a:rPr lang="en-US" dirty="0" smtClean="0"/>
-              <a:t>-active-</a:t>
-            </a:r>
-            <a:r>
-              <a:rPr lang="en-US" dirty="0" err="1" smtClean="0"/>
-              <a:t>fires.py</a:t>
-            </a:r>
-            <a:r>
-              <a:rPr lang="en-US" dirty="0" smtClean="0"/>
-              <a:t> </a:t>
-            </a:r>
-            <a:r>
-              <a:rPr lang="en-US" dirty="0" smtClean="0"/>
-              <a:t>--region </a:t>
-            </a:r>
-            <a:r>
-              <a:rPr lang="en-US" dirty="0"/>
-              <a:t>d02 --date 2016-04-15 </a:t>
-            </a:r>
-            <a:r>
-              <a:rPr lang="en-US" dirty="0" smtClean="0"/>
-              <a:t>-</a:t>
-            </a:r>
-            <a:r>
-              <a:rPr lang="en-US" dirty="0" smtClean="0"/>
-              <a:t>v</a:t>
+              <a:t>-v</a:t>
             </a:r>
             <a:endParaRPr lang="en-US" dirty="0"/>
           </a:p>

</xml_diff>

<commit_message>
Updated list of products
</commit_message>
<xml_diff>
--- a/ECA-RCCP-WorshopApr2016.pptx
+++ b/ECA-RCCP-WorshopApr2016.pptx
@@ -246,7 +246,7 @@
           <a:p>
             <a:fld id="{6E04E453-D430-B44E-9EFF-220B3399F38E}" type="datetimeFigureOut">
               <a:rPr lang="en-US" smtClean="0"/>
-              <a:t>4/26/16</a:t>
+              <a:t>4/27/16</a:t>
             </a:fld>
             <a:endParaRPr lang="en-US"/>
           </a:p>
@@ -952,7 +952,7 @@
           <a:p>
             <a:fld id="{2DBD2FC0-26C0-8B45-BC00-59DC2F9C0320}" type="datetimeFigureOut">
               <a:rPr lang="en-US" smtClean="0"/>
-              <a:t>4/26/16</a:t>
+              <a:t>4/27/16</a:t>
             </a:fld>
             <a:endParaRPr lang="en-US"/>
           </a:p>
@@ -1238,7 +1238,7 @@
           <a:p>
             <a:fld id="{2DBD2FC0-26C0-8B45-BC00-59DC2F9C0320}" type="datetimeFigureOut">
               <a:rPr lang="en-US" smtClean="0"/>
-              <a:t>4/26/16</a:t>
+              <a:t>4/27/16</a:t>
             </a:fld>
             <a:endParaRPr lang="en-US"/>
           </a:p>
@@ -1660,7 +1660,7 @@
           <a:p>
             <a:fld id="{2DBD2FC0-26C0-8B45-BC00-59DC2F9C0320}" type="datetimeFigureOut">
               <a:rPr lang="en-US" smtClean="0"/>
-              <a:t>4/26/16</a:t>
+              <a:t>4/27/16</a:t>
             </a:fld>
             <a:endParaRPr lang="en-US"/>
           </a:p>
@@ -2077,7 +2077,7 @@
           <a:p>
             <a:fld id="{2DBD2FC0-26C0-8B45-BC00-59DC2F9C0320}" type="datetimeFigureOut">
               <a:rPr lang="en-US" smtClean="0"/>
-              <a:t>4/26/16</a:t>
+              <a:t>4/27/16</a:t>
             </a:fld>
             <a:endParaRPr lang="en-US"/>
           </a:p>
@@ -2210,7 +2210,7 @@
           <a:p>
             <a:fld id="{2DBD2FC0-26C0-8B45-BC00-59DC2F9C0320}" type="datetimeFigureOut">
               <a:rPr lang="en-US" smtClean="0"/>
-              <a:t>4/26/16</a:t>
+              <a:t>4/27/16</a:t>
             </a:fld>
             <a:endParaRPr lang="en-US"/>
           </a:p>
@@ -2532,7 +2532,7 @@
           <a:p>
             <a:fld id="{2DBD2FC0-26C0-8B45-BC00-59DC2F9C0320}" type="datetimeFigureOut">
               <a:rPr lang="en-US" smtClean="0"/>
-              <a:t>4/26/16</a:t>
+              <a:t>4/27/16</a:t>
             </a:fld>
             <a:endParaRPr lang="en-US"/>
           </a:p>
@@ -2776,7 +2776,7 @@
           <a:p>
             <a:fld id="{2DBD2FC0-26C0-8B45-BC00-59DC2F9C0320}" type="datetimeFigureOut">
               <a:rPr lang="en-US" smtClean="0"/>
-              <a:t>4/26/16</a:t>
+              <a:t>4/27/16</a:t>
             </a:fld>
             <a:endParaRPr lang="en-US"/>
           </a:p>
@@ -3114,7 +3114,7 @@
           <a:p>
             <a:fld id="{2DBD2FC0-26C0-8B45-BC00-59DC2F9C0320}" type="datetimeFigureOut">
               <a:rPr lang="en-US" smtClean="0"/>
-              <a:t>4/26/16</a:t>
+              <a:t>4/27/16</a:t>
             </a:fld>
             <a:endParaRPr lang="en-US"/>
           </a:p>
@@ -3414,7 +3414,7 @@
           <a:p>
             <a:fld id="{2DBD2FC0-26C0-8B45-BC00-59DC2F9C0320}" type="datetimeFigureOut">
               <a:rPr lang="en-US" smtClean="0"/>
-              <a:t>4/26/16</a:t>
+              <a:t>4/27/16</a:t>
             </a:fld>
             <a:endParaRPr lang="en-US"/>
           </a:p>
@@ -3821,7 +3821,7 @@
           <a:p>
             <a:fld id="{2DBD2FC0-26C0-8B45-BC00-59DC2F9C0320}" type="datetimeFigureOut">
               <a:rPr lang="en-US" smtClean="0"/>
-              <a:t>4/26/16</a:t>
+              <a:t>4/27/16</a:t>
             </a:fld>
             <a:endParaRPr lang="en-US"/>
           </a:p>
@@ -4043,7 +4043,7 @@
           <a:p>
             <a:fld id="{2DBD2FC0-26C0-8B45-BC00-59DC2F9C0320}" type="datetimeFigureOut">
               <a:rPr lang="en-US" smtClean="0"/>
-              <a:t>4/26/16</a:t>
+              <a:t>4/27/16</a:t>
             </a:fld>
             <a:endParaRPr lang="en-US"/>
           </a:p>
@@ -4260,7 +4260,7 @@
           <a:p>
             <a:fld id="{2DBD2FC0-26C0-8B45-BC00-59DC2F9C0320}" type="datetimeFigureOut">
               <a:rPr lang="en-US" smtClean="0"/>
-              <a:t>4/26/16</a:t>
+              <a:t>4/27/16</a:t>
             </a:fld>
             <a:endParaRPr lang="en-US"/>
           </a:p>
@@ -4565,7 +4565,7 @@
           <a:p>
             <a:fld id="{2DBD2FC0-26C0-8B45-BC00-59DC2F9C0320}" type="datetimeFigureOut">
               <a:rPr lang="en-US" smtClean="0"/>
-              <a:t>4/26/16</a:t>
+              <a:t>4/27/16</a:t>
             </a:fld>
             <a:endParaRPr lang="en-US"/>
           </a:p>
@@ -4892,7 +4892,7 @@
           <a:p>
             <a:fld id="{2DBD2FC0-26C0-8B45-BC00-59DC2F9C0320}" type="datetimeFigureOut">
               <a:rPr lang="en-US" smtClean="0"/>
-              <a:t>4/26/16</a:t>
+              <a:t>4/27/16</a:t>
             </a:fld>
             <a:endParaRPr lang="en-US"/>
           </a:p>
@@ -5227,7 +5227,7 @@
           <a:p>
             <a:fld id="{2DBD2FC0-26C0-8B45-BC00-59DC2F9C0320}" type="datetimeFigureOut">
               <a:rPr lang="en-US" smtClean="0"/>
-              <a:t>4/26/16</a:t>
+              <a:t>4/27/16</a:t>
             </a:fld>
             <a:endParaRPr lang="en-US"/>
           </a:p>
@@ -5850,7 +5850,7 @@
           <a:p>
             <a:fld id="{2DBD2FC0-26C0-8B45-BC00-59DC2F9C0320}" type="datetimeFigureOut">
               <a:rPr lang="en-US" smtClean="0"/>
-              <a:t>4/26/16</a:t>
+              <a:t>4/27/16</a:t>
             </a:fld>
             <a:endParaRPr lang="en-US"/>
           </a:p>
@@ -6337,7 +6337,7 @@
           <a:p>
             <a:fld id="{2DBD2FC0-26C0-8B45-BC00-59DC2F9C0320}" type="datetimeFigureOut">
               <a:rPr lang="en-US" smtClean="0"/>
-              <a:t>4/26/16</a:t>
+              <a:t>4/27/16</a:t>
             </a:fld>
             <a:endParaRPr lang="en-US"/>
           </a:p>
@@ -6585,7 +6585,7 @@
           <a:p>
             <a:fld id="{2DBD2FC0-26C0-8B45-BC00-59DC2F9C0320}" type="datetimeFigureOut">
               <a:rPr lang="en-US" smtClean="0"/>
-              <a:t>4/26/16</a:t>
+              <a:t>4/27/16</a:t>
             </a:fld>
             <a:endParaRPr lang="en-US"/>
           </a:p>
@@ -6881,7 +6881,7 @@
           <a:p>
             <a:fld id="{2DBD2FC0-26C0-8B45-BC00-59DC2F9C0320}" type="datetimeFigureOut">
               <a:rPr lang="en-US" smtClean="0"/>
-              <a:t>4/26/16</a:t>
+              <a:t>4/27/16</a:t>
             </a:fld>
             <a:endParaRPr lang="en-US"/>
           </a:p>
@@ -18220,13 +18220,8 @@
           <a:p>
             <a:r>
               <a:rPr lang="en-US" dirty="0" smtClean="0"/>
-              <a:t>Augusto </a:t>
-            </a:r>
-            <a:r>
-              <a:rPr lang="en-US" dirty="0" smtClean="0"/>
-              <a:t>Valerio (DAI)</a:t>
-            </a:r>
-            <a:endParaRPr lang="en-US" dirty="0" smtClean="0"/>
+              <a:t>Augusto Valerio (DAI)</a:t>
+            </a:r>
           </a:p>
           <a:p>
             <a:r>
@@ -18252,18 +18247,12 @@
               <a:rPr lang="en-US" dirty="0" smtClean="0"/>
               <a:t> (MARN)</a:t>
             </a:r>
-            <a:endParaRPr lang="en-US" dirty="0" smtClean="0"/>
           </a:p>
           <a:p>
             <a:r>
               <a:rPr lang="en-US" dirty="0" smtClean="0"/>
-              <a:t>Amides </a:t>
-            </a:r>
-            <a:r>
-              <a:rPr lang="en-US" dirty="0" smtClean="0"/>
-              <a:t>Figueroa (consultant)</a:t>
-            </a:r>
-            <a:endParaRPr lang="en-US" dirty="0" smtClean="0"/>
+              <a:t>Amides Figueroa (consultant)</a:t>
+            </a:r>
           </a:p>
           <a:p>
             <a:r>
@@ -18658,7 +18647,11 @@
           <a:p>
             <a:r>
               <a:rPr lang="en-US" dirty="0" smtClean="0"/>
-              <a:t>Generating Products</a:t>
+              <a:t>Generating </a:t>
+            </a:r>
+            <a:r>
+              <a:rPr lang="en-US" dirty="0" smtClean="0"/>
+              <a:t>10 Products</a:t>
             </a:r>
             <a:endParaRPr lang="en-US" dirty="0"/>
           </a:p>
@@ -18676,13 +18669,13 @@
         </p:nvSpPr>
         <p:spPr>
           <a:xfrm>
-            <a:off x="200417" y="2209800"/>
-            <a:ext cx="8793272" cy="3916363"/>
+            <a:off x="200417" y="1456268"/>
+            <a:ext cx="8793272" cy="5249332"/>
           </a:xfrm>
         </p:spPr>
         <p:txBody>
           <a:bodyPr>
-            <a:normAutofit lnSpcReduction="10000"/>
+            <a:normAutofit fontScale="85000" lnSpcReduction="20000"/>
           </a:bodyPr>
           <a:lstStyle/>
           <a:p>
@@ -18868,8 +18861,114 @@
             </a:r>
             <a:r>
               <a:rPr lang="en-US" dirty="0" smtClean="0"/>
-              <a:t>-v</a:t>
-            </a:r>
+              <a:t>–v</a:t>
+            </a:r>
+          </a:p>
+          <a:p>
+            <a:r>
+              <a:rPr lang="en-US" dirty="0"/>
+              <a:t>$ python </a:t>
+            </a:r>
+            <a:r>
+              <a:rPr lang="en-US" dirty="0" smtClean="0"/>
+              <a:t>geos5.py </a:t>
+            </a:r>
+            <a:r>
+              <a:rPr lang="en-US" dirty="0"/>
+              <a:t>--date 2016-04-15 </a:t>
+            </a:r>
+            <a:r>
+              <a:rPr lang="en-US" dirty="0" smtClean="0"/>
+              <a:t>–v</a:t>
+            </a:r>
+            <a:endParaRPr lang="en-US" dirty="0"/>
+          </a:p>
+          <a:p>
+            <a:r>
+              <a:rPr lang="en-US" dirty="0"/>
+              <a:t>$ python </a:t>
+            </a:r>
+            <a:r>
+              <a:rPr lang="en-US" dirty="0" err="1" smtClean="0"/>
+              <a:t>gfms_vectorizer.py</a:t>
+            </a:r>
+            <a:r>
+              <a:rPr lang="en-US" dirty="0" smtClean="0"/>
+              <a:t> --</a:t>
+            </a:r>
+            <a:r>
+              <a:rPr lang="en-US" dirty="0"/>
+              <a:t>date 2016-04-15 </a:t>
+            </a:r>
+            <a:r>
+              <a:rPr lang="en-US" dirty="0" smtClean="0"/>
+              <a:t>–v</a:t>
+            </a:r>
+          </a:p>
+          <a:p>
+            <a:r>
+              <a:rPr lang="en-US" dirty="0"/>
+              <a:t>$ python </a:t>
+            </a:r>
+            <a:r>
+              <a:rPr lang="en-US" dirty="0" err="1" smtClean="0"/>
+              <a:t>viirs_CHLA</a:t>
+            </a:r>
+            <a:r>
+              <a:rPr lang="en-US" dirty="0" smtClean="0"/>
+              <a:t> –region d02 --</a:t>
+            </a:r>
+            <a:r>
+              <a:rPr lang="en-US" dirty="0"/>
+              <a:t>date 2016-04-15 </a:t>
+            </a:r>
+            <a:r>
+              <a:rPr lang="en-US" dirty="0" smtClean="0"/>
+              <a:t>–v</a:t>
+            </a:r>
+          </a:p>
+          <a:p>
+            <a:r>
+              <a:rPr lang="en-US" dirty="0" smtClean="0"/>
+              <a:t>[custom] $python </a:t>
+            </a:r>
+            <a:r>
+              <a:rPr lang="en-US" dirty="0" err="1" smtClean="0"/>
+              <a:t>forecastio.py</a:t>
+            </a:r>
+            <a:r>
+              <a:rPr lang="en-US" dirty="0" smtClean="0"/>
+              <a:t> –</a:t>
+            </a:r>
+            <a:r>
+              <a:rPr lang="en-US" dirty="0" err="1" smtClean="0"/>
+              <a:t>regiona</a:t>
+            </a:r>
+            <a:r>
+              <a:rPr lang="en-US" dirty="0" smtClean="0"/>
+              <a:t> d02 –date 2016-04-15 -v</a:t>
+            </a:r>
+            <a:endParaRPr lang="en-US" dirty="0"/>
+          </a:p>
+          <a:p>
+            <a:endParaRPr lang="en-US" dirty="0"/>
+          </a:p>
+          <a:p>
+            <a:endParaRPr lang="en-US" dirty="0"/>
+          </a:p>
+          <a:p>
+            <a:endParaRPr lang="en-US" dirty="0"/>
+          </a:p>
+          <a:p>
+            <a:pPr marL="0" indent="0">
+              <a:buNone/>
+            </a:pPr>
+            <a:endParaRPr lang="en-US" dirty="0"/>
+          </a:p>
+          <a:p>
+            <a:endParaRPr lang="en-US" dirty="0"/>
+          </a:p>
+          <a:p>
             <a:endParaRPr lang="en-US" dirty="0"/>
           </a:p>
           <a:p>

</xml_diff>